<commit_message>
update week 15 slide
</commit_message>
<xml_diff>
--- a/2019/slides/week15_1.pptx
+++ b/2019/slides/week15_1.pptx
@@ -280,7 +280,7 @@
           <a:p>
             <a:fld id="{8CCE4C83-8F64-4E29-91B9-0017BF1F34A9}" type="datetimeFigureOut">
               <a:rPr lang="en-US" smtClean="0"/>
-              <a:t>5/29/2019</a:t>
+              <a:t>5/30/2019</a:t>
             </a:fld>
             <a:endParaRPr lang="en-US" dirty="0"/>
           </a:p>
@@ -457,7 +457,7 @@
           <a:p>
             <a:fld id="{C36A45D3-9EDB-4B35-90F9-382768275B83}" type="datetimeFigureOut">
               <a:rPr lang="en-US" smtClean="0"/>
-              <a:t>5/29/2019</a:t>
+              <a:t>5/30/2019</a:t>
             </a:fld>
             <a:endParaRPr lang="en-US" dirty="0"/>
           </a:p>
@@ -7326,8 +7326,16 @@
               <a:t>bd)</a:t>
             </a:r>
             <a:r>
-              <a:rPr lang="ja-JP" altLang="en-US" dirty="0"/>
-              <a:t>⋅</a:t>
+              <a:rPr lang="zh-TW" altLang="en-US" dirty="0"/>
+              <a:t> </a:t>
+            </a:r>
+            <a:r>
+              <a:rPr lang="en-US" altLang="zh-TW" dirty="0"/>
+              <a:t>+</a:t>
+            </a:r>
+            <a:r>
+              <a:rPr lang="zh-TW" altLang="en-US" dirty="0"/>
+              <a:t> </a:t>
             </a:r>
             <a:r>
               <a:rPr lang="en-US" altLang="zh-TW" dirty="0"/>
@@ -7488,8 +7496,16 @@
               <a:t>bd)</a:t>
             </a:r>
             <a:r>
-              <a:rPr lang="ja-JP" altLang="en-US" dirty="0"/>
-              <a:t>⋅</a:t>
+              <a:rPr lang="zh-TW" altLang="en-US" dirty="0"/>
+              <a:t> </a:t>
+            </a:r>
+            <a:r>
+              <a:rPr lang="en-US" altLang="zh-TW" dirty="0"/>
+              <a:t>+</a:t>
+            </a:r>
+            <a:r>
+              <a:rPr lang="zh-TW" altLang="en-US" dirty="0"/>
+              <a:t> </a:t>
             </a:r>
             <a:r>
               <a:rPr lang="en-US" altLang="zh-TW" dirty="0"/>
@@ -7669,8 +7685,16 @@
               <a:t>bd)</a:t>
             </a:r>
             <a:r>
-              <a:rPr lang="ja-JP" altLang="en-US" dirty="0"/>
-              <a:t>⋅</a:t>
+              <a:rPr lang="zh-TW" altLang="en-US" dirty="0"/>
+              <a:t> </a:t>
+            </a:r>
+            <a:r>
+              <a:rPr lang="en-US" altLang="zh-TW" dirty="0"/>
+              <a:t>+</a:t>
+            </a:r>
+            <a:r>
+              <a:rPr lang="zh-TW" altLang="en-US" dirty="0"/>
+              <a:t> </a:t>
             </a:r>
             <a:r>
               <a:rPr lang="en-US" altLang="zh-TW" dirty="0"/>
@@ -7949,8 +7973,16 @@
               <a:t>bd)</a:t>
             </a:r>
             <a:r>
-              <a:rPr lang="ja-JP" altLang="en-US" dirty="0"/>
-              <a:t>⋅</a:t>
+              <a:rPr lang="zh-TW" altLang="en-US" dirty="0"/>
+              <a:t> </a:t>
+            </a:r>
+            <a:r>
+              <a:rPr lang="en-US" altLang="zh-TW" dirty="0"/>
+              <a:t>+</a:t>
+            </a:r>
+            <a:r>
+              <a:rPr lang="zh-TW" altLang="en-US" dirty="0"/>
+              <a:t> </a:t>
             </a:r>
             <a:r>
               <a:rPr lang="en-US" altLang="zh-TW" dirty="0"/>
@@ -8245,8 +8277,16 @@
               <a:t>bd)</a:t>
             </a:r>
             <a:r>
-              <a:rPr lang="ja-JP" altLang="en-US" dirty="0"/>
-              <a:t>⋅</a:t>
+              <a:rPr lang="zh-TW" altLang="en-US" dirty="0"/>
+              <a:t> </a:t>
+            </a:r>
+            <a:r>
+              <a:rPr lang="en-US" altLang="zh-TW" dirty="0"/>
+              <a:t>+</a:t>
+            </a:r>
+            <a:r>
+              <a:rPr lang="zh-TW" altLang="en-US" dirty="0"/>
+              <a:t> </a:t>
             </a:r>
             <a:r>
               <a:rPr lang="en-US" altLang="zh-TW" dirty="0"/>
@@ -8443,8 +8483,16 @@
               <a:t>bd)</a:t>
             </a:r>
             <a:r>
-              <a:rPr lang="ja-JP" altLang="en-US" dirty="0"/>
-              <a:t>⋅</a:t>
+              <a:rPr lang="zh-TW" altLang="en-US" dirty="0"/>
+              <a:t> </a:t>
+            </a:r>
+            <a:r>
+              <a:rPr lang="en-US" altLang="zh-TW" dirty="0"/>
+              <a:t>+</a:t>
+            </a:r>
+            <a:r>
+              <a:rPr lang="zh-TW" altLang="en-US" dirty="0"/>
+              <a:t> </a:t>
             </a:r>
             <a:r>
               <a:rPr lang="en-US" altLang="zh-TW" dirty="0"/>
@@ -8731,8 +8779,16 @@
               <a:t>bd)</a:t>
             </a:r>
             <a:r>
-              <a:rPr lang="ja-JP" altLang="en-US" dirty="0"/>
-              <a:t>⋅</a:t>
+              <a:rPr lang="zh-TW" altLang="en-US" dirty="0"/>
+              <a:t> </a:t>
+            </a:r>
+            <a:r>
+              <a:rPr lang="en-US" altLang="zh-TW" dirty="0"/>
+              <a:t>+</a:t>
+            </a:r>
+            <a:r>
+              <a:rPr lang="zh-TW" altLang="en-US" dirty="0"/>
+              <a:t> </a:t>
             </a:r>
             <a:r>
               <a:rPr lang="en-US" altLang="zh-TW" dirty="0"/>
@@ -8804,11 +8860,11 @@
             </a:r>
             <a:r>
               <a:rPr lang="ja-JP" altLang="en-US" dirty="0"/>
-              <a:t>⋅</a:t>
+              <a:t> </a:t>
             </a:r>
             <a:r>
               <a:rPr lang="en-US" altLang="zh-TW" dirty="0"/>
-              <a:t>(k</a:t>
+              <a:t>+ (k</a:t>
             </a:r>
             <a:r>
               <a:rPr lang="en-US" altLang="zh-TW" baseline="-25000" dirty="0"/>
@@ -9075,8 +9131,16 @@
               <a:t>bd)</a:t>
             </a:r>
             <a:r>
-              <a:rPr lang="ja-JP" altLang="en-US" dirty="0"/>
-              <a:t>⋅</a:t>
+              <a:rPr lang="zh-TW" altLang="en-US" dirty="0"/>
+              <a:t> </a:t>
+            </a:r>
+            <a:r>
+              <a:rPr lang="en-US" altLang="zh-TW" dirty="0"/>
+              <a:t>+</a:t>
+            </a:r>
+            <a:r>
+              <a:rPr lang="zh-TW" altLang="en-US" dirty="0"/>
+              <a:t> </a:t>
             </a:r>
             <a:r>
               <a:rPr lang="en-US" altLang="zh-TW" dirty="0"/>
@@ -9148,11 +9212,11 @@
             </a:r>
             <a:r>
               <a:rPr lang="ja-JP" altLang="en-US" dirty="0"/>
-              <a:t>⋅</a:t>
+              <a:t> </a:t>
             </a:r>
             <a:r>
               <a:rPr lang="en-US" altLang="zh-TW" dirty="0"/>
-              <a:t>(k</a:t>
+              <a:t>+ (k</a:t>
             </a:r>
             <a:r>
               <a:rPr lang="en-US" altLang="zh-TW" baseline="-25000" dirty="0"/>
@@ -9218,6 +9282,42 @@
           </a:p>
         </p:txBody>
       </p:sp>
+      <p:pic>
+        <p:nvPicPr>
+          <p:cNvPr id="5" name="圖片 4">
+            <a:extLst>
+              <a:ext uri="{FF2B5EF4-FFF2-40B4-BE49-F238E27FC236}">
+                <a16:creationId xmlns:a16="http://schemas.microsoft.com/office/drawing/2014/main" id="{4098C702-F4BD-4AD7-B4A4-3A4E86C8FB18}"/>
+              </a:ext>
+            </a:extLst>
+          </p:cNvPr>
+          <p:cNvPicPr>
+            <a:picLocks noChangeAspect="1"/>
+          </p:cNvPicPr>
+          <p:nvPr/>
+        </p:nvPicPr>
+        <p:blipFill>
+          <a:blip r:embed="rId2">
+            <a:extLst>
+              <a:ext uri="{28A0092B-C50C-407E-A947-70E740481C1C}">
+                <a14:useLocalDpi xmlns:a14="http://schemas.microsoft.com/office/drawing/2010/main" val="0"/>
+              </a:ext>
+            </a:extLst>
+          </a:blip>
+          <a:stretch>
+            <a:fillRect/>
+          </a:stretch>
+        </p:blipFill>
+        <p:spPr>
+          <a:xfrm>
+            <a:off x="6519123" y="3804804"/>
+            <a:ext cx="2818248" cy="2507096"/>
+          </a:xfrm>
+          <a:prstGeom prst="rect">
+            <a:avLst/>
+          </a:prstGeom>
+        </p:spPr>
+      </p:pic>
     </p:spTree>
     <p:extLst>
       <p:ext uri="{BB962C8B-B14F-4D97-AF65-F5344CB8AC3E}">
@@ -11724,6 +11824,34 @@
               <a:t>凡是遇到乘法運算，都使用同樣的演算法</a:t>
             </a:r>
             <a:endParaRPr lang="en-US" altLang="zh-TW" dirty="0"/>
+          </a:p>
+          <a:p>
+            <a:pPr marL="0" indent="0">
+              <a:buNone/>
+            </a:pPr>
+            <a:endParaRPr lang="en-US" altLang="zh-TW" dirty="0"/>
+          </a:p>
+          <a:p>
+            <a:pPr marL="0" indent="0">
+              <a:buNone/>
+            </a:pPr>
+            <a:r>
+              <a:rPr lang="zh-TW" altLang="en-US" dirty="0">
+                <a:solidFill>
+                  <a:schemeClr val="bg1">
+                    <a:lumMod val="75000"/>
+                  </a:schemeClr>
+                </a:solidFill>
+              </a:rPr>
+              <a:t>感恩分治 讚嘆分治</a:t>
+            </a:r>
+            <a:endParaRPr lang="en-US" altLang="zh-TW" dirty="0">
+              <a:solidFill>
+                <a:schemeClr val="bg1">
+                  <a:lumMod val="75000"/>
+                </a:schemeClr>
+              </a:solidFill>
+            </a:endParaRPr>
           </a:p>
         </p:txBody>
       </p:sp>
@@ -13017,6 +13145,46 @@
                 <a:ea typeface="Menlo"/>
               </a:rPr>
               <a:t>);</a:t>
+            </a:r>
+            <a:r>
+              <a:rPr lang="zh-TW" altLang="en-US" dirty="0">
+                <a:solidFill>
+                  <a:srgbClr val="999999"/>
+                </a:solidFill>
+                <a:latin typeface="Consolas" panose="020B0609020204030204" pitchFamily="49" charset="0"/>
+                <a:ea typeface="Menlo"/>
+              </a:rPr>
+              <a:t> </a:t>
+            </a:r>
+            <a:r>
+              <a:rPr lang="en-US" altLang="zh-TW" dirty="0">
+                <a:solidFill>
+                  <a:srgbClr val="999999"/>
+                </a:solidFill>
+                <a:latin typeface="Consolas" panose="020B0609020204030204" pitchFamily="49" charset="0"/>
+                <a:ea typeface="Menlo"/>
+              </a:rPr>
+              <a:t>// since </a:t>
+            </a:r>
+            <a:r>
+              <a:rPr lang="en-US" altLang="zh-TW" dirty="0" err="1">
+                <a:solidFill>
+                  <a:srgbClr val="999999"/>
+                </a:solidFill>
+                <a:latin typeface="Consolas" panose="020B0609020204030204" pitchFamily="49" charset="0"/>
+                <a:ea typeface="Menlo"/>
+              </a:rPr>
+              <a:t>c++</a:t>
+            </a:r>
+            <a:r>
+              <a:rPr lang="en-US" altLang="zh-TW" dirty="0">
+                <a:solidFill>
+                  <a:srgbClr val="999999"/>
+                </a:solidFill>
+                <a:latin typeface="Consolas" panose="020B0609020204030204" pitchFamily="49" charset="0"/>
+                <a:ea typeface="Menlo"/>
+              </a:rPr>
+              <a:t>17</a:t>
             </a:r>
             <a:br>
               <a:rPr lang="en-US" altLang="ja-JP" dirty="0">
@@ -18461,6 +18629,26 @@
                 <a:ea typeface="Menlo"/>
               </a:rPr>
               <a:t> </a:t>
+            </a:r>
+            <a:r>
+              <a:rPr lang="zh-TW" altLang="zh-TW" dirty="0">
+                <a:solidFill>
+                  <a:srgbClr val="990055"/>
+                </a:solidFill>
+                <a:latin typeface="Consolas" panose="020B0609020204030204" pitchFamily="49" charset="0"/>
+                <a:ea typeface="Menlo"/>
+              </a:rPr>
+              <a:t>0.69</a:t>
+            </a:r>
+            <a:r>
+              <a:rPr lang="zh-TW" altLang="zh-TW" dirty="0">
+                <a:solidFill>
+                  <a:srgbClr val="9A6E3A"/>
+                </a:solidFill>
+                <a:latin typeface="Consolas" panose="020B0609020204030204" pitchFamily="49" charset="0"/>
+                <a:ea typeface="Menlo"/>
+              </a:rPr>
+              <a:t>*</a:t>
             </a:r>
             <a:r>
               <a:rPr lang="en-US" altLang="zh-TW" dirty="0">

</xml_diff>